<commit_message>
cleanup code - presentation slides
</commit_message>
<xml_diff>
--- a/docs/genericnotificationsystem.pptx
+++ b/docs/genericnotificationsystem.pptx
@@ -5535,6 +5535,216 @@
           </a:fontRef>
         </p:style>
       </p:cxnSp>
+      <p:pic>
+        <p:nvPicPr>
+          <p:cNvPr id="5" name="Picture 4">
+            <a:extLst>
+              <a:ext uri="{FF2B5EF4-FFF2-40B4-BE49-F238E27FC236}">
+                <a16:creationId xmlns:a16="http://schemas.microsoft.com/office/drawing/2014/main" id="{4BD3A1CE-569F-4A43-B8FD-C61275E68549}"/>
+              </a:ext>
+            </a:extLst>
+          </p:cNvPr>
+          <p:cNvPicPr>
+            <a:picLocks noChangeAspect="1"/>
+          </p:cNvPicPr>
+          <p:nvPr/>
+        </p:nvPicPr>
+        <p:blipFill>
+          <a:blip r:embed="rId2"/>
+          <a:stretch>
+            <a:fillRect/>
+          </a:stretch>
+        </p:blipFill>
+        <p:spPr>
+          <a:xfrm>
+            <a:off x="9978008" y="2821540"/>
+            <a:ext cx="545936" cy="545936"/>
+          </a:xfrm>
+          <a:prstGeom prst="rect">
+            <a:avLst/>
+          </a:prstGeom>
+        </p:spPr>
+      </p:pic>
+      <p:pic>
+        <p:nvPicPr>
+          <p:cNvPr id="9" name="Picture 8">
+            <a:extLst>
+              <a:ext uri="{FF2B5EF4-FFF2-40B4-BE49-F238E27FC236}">
+                <a16:creationId xmlns:a16="http://schemas.microsoft.com/office/drawing/2014/main" id="{3163B6B4-84A3-2843-AC9E-9B80B012EC4C}"/>
+              </a:ext>
+            </a:extLst>
+          </p:cNvPr>
+          <p:cNvPicPr>
+            <a:picLocks noChangeAspect="1"/>
+          </p:cNvPicPr>
+          <p:nvPr/>
+        </p:nvPicPr>
+        <p:blipFill>
+          <a:blip r:embed="rId3"/>
+          <a:stretch>
+            <a:fillRect/>
+          </a:stretch>
+        </p:blipFill>
+        <p:spPr>
+          <a:xfrm>
+            <a:off x="9919144" y="2299563"/>
+            <a:ext cx="635425" cy="635425"/>
+          </a:xfrm>
+          <a:prstGeom prst="rect">
+            <a:avLst/>
+          </a:prstGeom>
+        </p:spPr>
+      </p:pic>
+      <p:pic>
+        <p:nvPicPr>
+          <p:cNvPr id="16" name="Picture 15">
+            <a:extLst>
+              <a:ext uri="{FF2B5EF4-FFF2-40B4-BE49-F238E27FC236}">
+                <a16:creationId xmlns:a16="http://schemas.microsoft.com/office/drawing/2014/main" id="{FA21C640-D9CD-E746-B4BB-88E57710594C}"/>
+              </a:ext>
+            </a:extLst>
+          </p:cNvPr>
+          <p:cNvPicPr>
+            <a:picLocks noChangeAspect="1"/>
+          </p:cNvPicPr>
+          <p:nvPr/>
+        </p:nvPicPr>
+        <p:blipFill>
+          <a:blip r:embed="rId4"/>
+          <a:stretch>
+            <a:fillRect/>
+          </a:stretch>
+        </p:blipFill>
+        <p:spPr>
+          <a:xfrm>
+            <a:off x="3119056" y="6339840"/>
+            <a:ext cx="405894" cy="405894"/>
+          </a:xfrm>
+          <a:prstGeom prst="rect">
+            <a:avLst/>
+          </a:prstGeom>
+        </p:spPr>
+      </p:pic>
+      <p:pic>
+        <p:nvPicPr>
+          <p:cNvPr id="49" name="Picture 48">
+            <a:extLst>
+              <a:ext uri="{FF2B5EF4-FFF2-40B4-BE49-F238E27FC236}">
+                <a16:creationId xmlns:a16="http://schemas.microsoft.com/office/drawing/2014/main" id="{A15C8809-EC48-B94A-8EEA-043E50C1461C}"/>
+              </a:ext>
+            </a:extLst>
+          </p:cNvPr>
+          <p:cNvPicPr>
+            <a:picLocks noChangeAspect="1"/>
+          </p:cNvPicPr>
+          <p:nvPr/>
+        </p:nvPicPr>
+        <p:blipFill>
+          <a:blip r:embed="rId4"/>
+          <a:stretch>
+            <a:fillRect/>
+          </a:stretch>
+        </p:blipFill>
+        <p:spPr>
+          <a:xfrm>
+            <a:off x="10033909" y="1826912"/>
+            <a:ext cx="405894" cy="405894"/>
+          </a:xfrm>
+          <a:prstGeom prst="rect">
+            <a:avLst/>
+          </a:prstGeom>
+        </p:spPr>
+      </p:pic>
+      <p:pic>
+        <p:nvPicPr>
+          <p:cNvPr id="56" name="Picture 55">
+            <a:extLst>
+              <a:ext uri="{FF2B5EF4-FFF2-40B4-BE49-F238E27FC236}">
+                <a16:creationId xmlns:a16="http://schemas.microsoft.com/office/drawing/2014/main" id="{ACF365A2-C823-1946-AF42-C82943F73A33}"/>
+              </a:ext>
+            </a:extLst>
+          </p:cNvPr>
+          <p:cNvPicPr>
+            <a:picLocks noChangeAspect="1"/>
+          </p:cNvPicPr>
+          <p:nvPr/>
+        </p:nvPicPr>
+        <p:blipFill>
+          <a:blip r:embed="rId2"/>
+          <a:stretch>
+            <a:fillRect/>
+          </a:stretch>
+        </p:blipFill>
+        <p:spPr>
+          <a:xfrm>
+            <a:off x="10028697" y="4416836"/>
+            <a:ext cx="545936" cy="545936"/>
+          </a:xfrm>
+          <a:prstGeom prst="rect">
+            <a:avLst/>
+          </a:prstGeom>
+        </p:spPr>
+      </p:pic>
+      <p:pic>
+        <p:nvPicPr>
+          <p:cNvPr id="57" name="Picture 56">
+            <a:extLst>
+              <a:ext uri="{FF2B5EF4-FFF2-40B4-BE49-F238E27FC236}">
+                <a16:creationId xmlns:a16="http://schemas.microsoft.com/office/drawing/2014/main" id="{2F4F764E-7C8B-9043-9311-BE86E2C4275A}"/>
+              </a:ext>
+            </a:extLst>
+          </p:cNvPr>
+          <p:cNvPicPr>
+            <a:picLocks noChangeAspect="1"/>
+          </p:cNvPicPr>
+          <p:nvPr/>
+        </p:nvPicPr>
+        <p:blipFill>
+          <a:blip r:embed="rId3"/>
+          <a:stretch>
+            <a:fillRect/>
+          </a:stretch>
+        </p:blipFill>
+        <p:spPr>
+          <a:xfrm>
+            <a:off x="9969833" y="3894859"/>
+            <a:ext cx="635425" cy="635425"/>
+          </a:xfrm>
+          <a:prstGeom prst="rect">
+            <a:avLst/>
+          </a:prstGeom>
+        </p:spPr>
+      </p:pic>
+      <p:pic>
+        <p:nvPicPr>
+          <p:cNvPr id="58" name="Picture 57">
+            <a:extLst>
+              <a:ext uri="{FF2B5EF4-FFF2-40B4-BE49-F238E27FC236}">
+                <a16:creationId xmlns:a16="http://schemas.microsoft.com/office/drawing/2014/main" id="{DDB28BCA-52A7-514D-9691-8A1F2C9711FD}"/>
+              </a:ext>
+            </a:extLst>
+          </p:cNvPr>
+          <p:cNvPicPr>
+            <a:picLocks noChangeAspect="1"/>
+          </p:cNvPicPr>
+          <p:nvPr/>
+        </p:nvPicPr>
+        <p:blipFill>
+          <a:blip r:embed="rId4"/>
+          <a:stretch>
+            <a:fillRect/>
+          </a:stretch>
+        </p:blipFill>
+        <p:spPr>
+          <a:xfrm>
+            <a:off x="10084598" y="3422208"/>
+            <a:ext cx="405894" cy="405894"/>
+          </a:xfrm>
+          <a:prstGeom prst="rect">
+            <a:avLst/>
+          </a:prstGeom>
+        </p:spPr>
+      </p:pic>
     </p:spTree>
     <p:extLst>
       <p:ext uri="{BB962C8B-B14F-4D97-AF65-F5344CB8AC3E}">

</xml_diff>